<commit_message>
New Diagram for Machine Model. Moved compositing discussion to Machine model chapter. Mostly finished Machine model chapter. Sectioned background. Fixed typo in section heading.
</commit_message>
<xml_diff>
--- a/fig/typical_projection_system.pptx
+++ b/fig/typical_projection_system.pptx
@@ -259,7 +259,7 @@
           <a:p>
             <a:fld id="{5DC56E2A-AD1A-46AE-8FBF-9444BD559EBF}" type="datetimeFigureOut">
               <a:rPr lang="en-US" smtClean="0"/>
-              <a:t>3/21/2020</a:t>
+              <a:t>11/12/2020</a:t>
             </a:fld>
             <a:endParaRPr lang="en-US"/>
           </a:p>
@@ -457,7 +457,7 @@
           <a:p>
             <a:fld id="{5DC56E2A-AD1A-46AE-8FBF-9444BD559EBF}" type="datetimeFigureOut">
               <a:rPr lang="en-US" smtClean="0"/>
-              <a:t>3/21/2020</a:t>
+              <a:t>11/12/2020</a:t>
             </a:fld>
             <a:endParaRPr lang="en-US"/>
           </a:p>
@@ -665,7 +665,7 @@
           <a:p>
             <a:fld id="{5DC56E2A-AD1A-46AE-8FBF-9444BD559EBF}" type="datetimeFigureOut">
               <a:rPr lang="en-US" smtClean="0"/>
-              <a:t>3/21/2020</a:t>
+              <a:t>11/12/2020</a:t>
             </a:fld>
             <a:endParaRPr lang="en-US"/>
           </a:p>
@@ -863,7 +863,7 @@
           <a:p>
             <a:fld id="{5DC56E2A-AD1A-46AE-8FBF-9444BD559EBF}" type="datetimeFigureOut">
               <a:rPr lang="en-US" smtClean="0"/>
-              <a:t>3/21/2020</a:t>
+              <a:t>11/12/2020</a:t>
             </a:fld>
             <a:endParaRPr lang="en-US"/>
           </a:p>
@@ -1138,7 +1138,7 @@
           <a:p>
             <a:fld id="{5DC56E2A-AD1A-46AE-8FBF-9444BD559EBF}" type="datetimeFigureOut">
               <a:rPr lang="en-US" smtClean="0"/>
-              <a:t>3/21/2020</a:t>
+              <a:t>11/12/2020</a:t>
             </a:fld>
             <a:endParaRPr lang="en-US"/>
           </a:p>
@@ -1403,7 +1403,7 @@
           <a:p>
             <a:fld id="{5DC56E2A-AD1A-46AE-8FBF-9444BD559EBF}" type="datetimeFigureOut">
               <a:rPr lang="en-US" smtClean="0"/>
-              <a:t>3/21/2020</a:t>
+              <a:t>11/12/2020</a:t>
             </a:fld>
             <a:endParaRPr lang="en-US"/>
           </a:p>
@@ -1815,7 +1815,7 @@
           <a:p>
             <a:fld id="{5DC56E2A-AD1A-46AE-8FBF-9444BD559EBF}" type="datetimeFigureOut">
               <a:rPr lang="en-US" smtClean="0"/>
-              <a:t>3/21/2020</a:t>
+              <a:t>11/12/2020</a:t>
             </a:fld>
             <a:endParaRPr lang="en-US"/>
           </a:p>
@@ -1956,7 +1956,7 @@
           <a:p>
             <a:fld id="{5DC56E2A-AD1A-46AE-8FBF-9444BD559EBF}" type="datetimeFigureOut">
               <a:rPr lang="en-US" smtClean="0"/>
-              <a:t>3/21/2020</a:t>
+              <a:t>11/12/2020</a:t>
             </a:fld>
             <a:endParaRPr lang="en-US"/>
           </a:p>
@@ -2069,7 +2069,7 @@
           <a:p>
             <a:fld id="{5DC56E2A-AD1A-46AE-8FBF-9444BD559EBF}" type="datetimeFigureOut">
               <a:rPr lang="en-US" smtClean="0"/>
-              <a:t>3/21/2020</a:t>
+              <a:t>11/12/2020</a:t>
             </a:fld>
             <a:endParaRPr lang="en-US"/>
           </a:p>
@@ -2380,7 +2380,7 @@
           <a:p>
             <a:fld id="{5DC56E2A-AD1A-46AE-8FBF-9444BD559EBF}" type="datetimeFigureOut">
               <a:rPr lang="en-US" smtClean="0"/>
-              <a:t>3/21/2020</a:t>
+              <a:t>11/12/2020</a:t>
             </a:fld>
             <a:endParaRPr lang="en-US"/>
           </a:p>
@@ -2668,7 +2668,7 @@
           <a:p>
             <a:fld id="{5DC56E2A-AD1A-46AE-8FBF-9444BD559EBF}" type="datetimeFigureOut">
               <a:rPr lang="en-US" smtClean="0"/>
-              <a:t>3/21/2020</a:t>
+              <a:t>11/12/2020</a:t>
             </a:fld>
             <a:endParaRPr lang="en-US"/>
           </a:p>
@@ -2909,7 +2909,7 @@
           <a:p>
             <a:fld id="{5DC56E2A-AD1A-46AE-8FBF-9444BD559EBF}" type="datetimeFigureOut">
               <a:rPr lang="en-US" smtClean="0"/>
-              <a:t>3/21/2020</a:t>
+              <a:t>11/12/2020</a:t>
             </a:fld>
             <a:endParaRPr lang="en-US"/>
           </a:p>
@@ -3437,6 +3437,19 @@
               </a:rPr>
               <a:t>Non-Uniformity Correction</a:t>
             </a:r>
+            <a:r>
+              <a:rPr lang="en-US">
+                <a:solidFill>
+                  <a:schemeClr val="tx1"/>
+                </a:solidFill>
+              </a:rPr>
+              <a:t>/ Reordering</a:t>
+            </a:r>
+            <a:endParaRPr lang="en-US" dirty="0">
+              <a:solidFill>
+                <a:schemeClr val="tx1"/>
+              </a:solidFill>
+            </a:endParaRPr>
           </a:p>
         </p:txBody>
       </p:sp>

</xml_diff>